<commit_message>
Update of Activity Plan for Next Year
Update of Activity Plan for Next Year
</commit_message>
<xml_diff>
--- a/Civilworks cost/PPT Progress Review Meeting/New Slide For Activity Plan.pptx
+++ b/Civilworks cost/PPT Progress Review Meeting/New Slide For Activity Plan.pptx
@@ -318,7 +318,6 @@
             <c:showLeaderLines val="0"/>
             <c:extLst>
               <c:ext xmlns:c15="http://schemas.microsoft.com/office/drawing/2012/chart" uri="{CE6537A1-D6FC-4f65-9D91-7224C49458BB}">
-                <c15:layout/>
                 <c15:showLeaderLines val="1"/>
                 <c15:leaderLines>
                   <c:spPr>
@@ -432,7 +431,6 @@
             <c:showLeaderLines val="0"/>
             <c:extLst>
               <c:ext xmlns:c15="http://schemas.microsoft.com/office/drawing/2012/chart" uri="{CE6537A1-D6FC-4f65-9D91-7224C49458BB}">
-                <c15:layout/>
                 <c15:showLeaderLines val="1"/>
                 <c15:leaderLines>
                   <c:spPr>
@@ -546,7 +544,6 @@
             <c:showLeaderLines val="0"/>
             <c:extLst>
               <c:ext xmlns:c15="http://schemas.microsoft.com/office/drawing/2012/chart" uri="{CE6537A1-D6FC-4f65-9D91-7224C49458BB}">
-                <c15:layout/>
                 <c15:showLeaderLines val="1"/>
                 <c15:leaderLines>
                   <c:spPr>
@@ -660,7 +657,6 @@
             <c:showLeaderLines val="0"/>
             <c:extLst>
               <c:ext xmlns:c15="http://schemas.microsoft.com/office/drawing/2012/chart" uri="{CE6537A1-D6FC-4f65-9D91-7224C49458BB}">
-                <c15:layout/>
                 <c15:showLeaderLines val="1"/>
                 <c15:leaderLines>
                   <c:spPr>
@@ -774,7 +770,6 @@
             <c:showLeaderLines val="0"/>
             <c:extLst>
               <c:ext xmlns:c15="http://schemas.microsoft.com/office/drawing/2012/chart" uri="{CE6537A1-D6FC-4f65-9D91-7224C49458BB}">
-                <c15:layout/>
                 <c15:showLeaderLines val="0"/>
               </c:ext>
             </c:extLst>
@@ -874,7 +869,6 @@
             <c:showLeaderLines val="0"/>
             <c:extLst>
               <c:ext xmlns:c15="http://schemas.microsoft.com/office/drawing/2012/chart" uri="{CE6537A1-D6FC-4f65-9D91-7224C49458BB}">
-                <c15:layout/>
                 <c15:showLeaderLines val="0"/>
               </c:ext>
             </c:extLst>
@@ -978,7 +972,6 @@
             <c:showLeaderLines val="0"/>
             <c:extLst>
               <c:ext xmlns:c15="http://schemas.microsoft.com/office/drawing/2012/chart" uri="{CE6537A1-D6FC-4f65-9D91-7224C49458BB}">
-                <c15:layout/>
                 <c15:showLeaderLines val="0"/>
               </c:ext>
             </c:extLst>
@@ -1080,7 +1073,6 @@
             <c:showLeaderLines val="0"/>
             <c:extLst>
               <c:ext xmlns:c15="http://schemas.microsoft.com/office/drawing/2012/chart" uri="{CE6537A1-D6FC-4f65-9D91-7224C49458BB}">
-                <c15:layout/>
                 <c15:showLeaderLines val="0"/>
               </c:ext>
             </c:extLst>
@@ -1162,9 +1154,7 @@
               <c:showPercent val="0"/>
               <c:showBubbleSize val="0"/>
               <c:extLst>
-                <c:ext xmlns:c15="http://schemas.microsoft.com/office/drawing/2012/chart" uri="{CE6537A1-D6FC-4f65-9D91-7224C49458BB}">
-                  <c15:layout/>
-                </c:ext>
+                <c:ext xmlns:c15="http://schemas.microsoft.com/office/drawing/2012/chart" uri="{CE6537A1-D6FC-4f65-9D91-7224C49458BB}"/>
                 <c:ext xmlns:c16="http://schemas.microsoft.com/office/drawing/2014/chart" uri="{C3380CC4-5D6E-409C-BE32-E72D297353CC}">
                   <c16:uniqueId val="{00000008-AEDC-422B-AEC2-05AE7C2406AC}"/>
                 </c:ext>
@@ -1205,7 +1195,6 @@
             <c:showLeaderLines val="0"/>
             <c:extLst>
               <c:ext xmlns:c15="http://schemas.microsoft.com/office/drawing/2012/chart" uri="{CE6537A1-D6FC-4f65-9D91-7224C49458BB}">
-                <c15:layout/>
                 <c15:showLeaderLines val="0"/>
               </c:ext>
             </c:extLst>
@@ -1355,7 +1344,6 @@
               </a:p>
             </c:rich>
           </c:tx>
-          <c:layout/>
           <c:overlay val="0"/>
           <c:spPr>
             <a:noFill/>
@@ -1635,7 +1623,7 @@
           <a:p>
             <a:fld id="{50AB58AB-BAB2-4BBD-806D-2B23C8796898}" type="datetimeFigureOut">
               <a:rPr lang="en-US" smtClean="0"/>
-              <a:t>11/11/2020</a:t>
+              <a:t>11/12/2020</a:t>
             </a:fld>
             <a:endParaRPr lang="en-US"/>
           </a:p>
@@ -1800,7 +1788,7 @@
           <a:p>
             <a:fld id="{970711CD-50B7-4B2E-AC67-366650BB4684}" type="datetimeFigureOut">
               <a:rPr lang="en-CA" smtClean="0"/>
-              <a:t>2020-11-11</a:t>
+              <a:t>2020-11-12</a:t>
             </a:fld>
             <a:endParaRPr lang="en-CA"/>
           </a:p>
@@ -3057,7 +3045,7 @@
           <a:p>
             <a:fld id="{264EB2CF-26B1-49F6-AC59-C5951E9CCD88}" type="datetime1">
               <a:rPr lang="en-CA" smtClean="0"/>
-              <a:t>2020-11-11</a:t>
+              <a:t>2020-11-12</a:t>
             </a:fld>
             <a:endParaRPr lang="en-CA"/>
           </a:p>
@@ -3266,7 +3254,7 @@
           <a:p>
             <a:fld id="{BAD55A09-2758-458E-8A1F-D19E90193B85}" type="datetime1">
               <a:rPr lang="en-CA" smtClean="0"/>
-              <a:t>2020-11-11</a:t>
+              <a:t>2020-11-12</a:t>
             </a:fld>
             <a:endParaRPr lang="en-CA"/>
           </a:p>
@@ -3476,7 +3464,7 @@
           <a:p>
             <a:fld id="{C0046350-24C3-4A1C-A4CF-38E705C6DC68}" type="datetime1">
               <a:rPr lang="en-CA" smtClean="0"/>
-              <a:t>2020-11-11</a:t>
+              <a:t>2020-11-12</a:t>
             </a:fld>
             <a:endParaRPr lang="en-CA"/>
           </a:p>
@@ -3676,7 +3664,7 @@
           <a:p>
             <a:fld id="{19AD295E-C4BB-4647-A97E-F60567811666}" type="datetime1">
               <a:rPr lang="en-CA" smtClean="0"/>
-              <a:t>2020-11-11</a:t>
+              <a:t>2020-11-12</a:t>
             </a:fld>
             <a:endParaRPr lang="en-CA"/>
           </a:p>
@@ -3961,7 +3949,7 @@
           <a:p>
             <a:fld id="{9E57256F-65D3-4213-A810-6EFA6E03B848}" type="datetime1">
               <a:rPr lang="en-CA" smtClean="0"/>
-              <a:t>2020-11-11</a:t>
+              <a:t>2020-11-12</a:t>
             </a:fld>
             <a:endParaRPr lang="en-CA"/>
           </a:p>
@@ -4229,7 +4217,7 @@
           <a:p>
             <a:fld id="{6C140C0E-2909-418A-99BC-3D816BC5AEC5}" type="datetime1">
               <a:rPr lang="en-CA" smtClean="0"/>
-              <a:t>2020-11-11</a:t>
+              <a:t>2020-11-12</a:t>
             </a:fld>
             <a:endParaRPr lang="en-CA"/>
           </a:p>
@@ -4644,7 +4632,7 @@
           <a:p>
             <a:fld id="{FFB71C27-33F0-4196-BE6B-223C1BE61D5D}" type="datetime1">
               <a:rPr lang="en-CA" smtClean="0"/>
-              <a:t>2020-11-11</a:t>
+              <a:t>2020-11-12</a:t>
             </a:fld>
             <a:endParaRPr lang="en-CA"/>
           </a:p>
@@ -4786,7 +4774,7 @@
           <a:p>
             <a:fld id="{6BB9BB04-A1F7-48D3-9D11-2FA97CA4860D}" type="datetime1">
               <a:rPr lang="en-CA" smtClean="0"/>
-              <a:t>2020-11-11</a:t>
+              <a:t>2020-11-12</a:t>
             </a:fld>
             <a:endParaRPr lang="en-CA"/>
           </a:p>
@@ -4899,7 +4887,7 @@
           <a:p>
             <a:fld id="{7403C8F2-475C-4669-AD82-9D80056F4E0B}" type="datetime1">
               <a:rPr lang="en-CA" smtClean="0"/>
-              <a:t>2020-11-11</a:t>
+              <a:t>2020-11-12</a:t>
             </a:fld>
             <a:endParaRPr lang="en-CA"/>
           </a:p>
@@ -5212,7 +5200,7 @@
           <a:p>
             <a:fld id="{EC6FBADD-9DDF-40A1-AED6-AF17E384D551}" type="datetime1">
               <a:rPr lang="en-CA" smtClean="0"/>
-              <a:t>2020-11-11</a:t>
+              <a:t>2020-11-12</a:t>
             </a:fld>
             <a:endParaRPr lang="en-CA"/>
           </a:p>
@@ -5501,7 +5489,7 @@
           <a:p>
             <a:fld id="{4E440CF9-45A1-496F-B71C-3F256FE68A8D}" type="datetime1">
               <a:rPr lang="en-CA" smtClean="0"/>
-              <a:t>2020-11-11</a:t>
+              <a:t>2020-11-12</a:t>
             </a:fld>
             <a:endParaRPr lang="en-CA"/>
           </a:p>
@@ -5744,7 +5732,7 @@
           <a:p>
             <a:fld id="{D9ABF4C7-9348-48B6-B3A5-9D460AFB5B14}" type="datetime1">
               <a:rPr lang="en-CA" smtClean="0"/>
-              <a:t>2020-11-11</a:t>
+              <a:t>2020-11-12</a:t>
             </a:fld>
             <a:endParaRPr lang="en-CA"/>
           </a:p>
@@ -6506,7 +6494,7 @@
           <a:graphicData uri="http://schemas.openxmlformats.org/presentationml/2006/ole">
             <mc:AlternateContent xmlns:mc="http://schemas.openxmlformats.org/markup-compatibility/2006">
               <mc:Choice xmlns:v="urn:schemas-microsoft-com:vml" Requires="v">
-                <p:oleObj spid="_x0000_s22535" name="PDF" r:id="rId3" imgW="0" imgH="360" progId="FoxitPhantomPDF.Document">
+                <p:oleObj spid="_x0000_s22539" name="PDF" r:id="rId3" imgW="0" imgH="360" progId="FoxitPhantomPDF.Document">
                   <p:embed/>
                 </p:oleObj>
               </mc:Choice>
@@ -6690,7 +6678,7 @@
           <a:graphicData uri="http://schemas.openxmlformats.org/presentationml/2006/ole">
             <mc:AlternateContent xmlns:mc="http://schemas.openxmlformats.org/markup-compatibility/2006">
               <mc:Choice xmlns:v="urn:schemas-microsoft-com:vml" Requires="v">
-                <p:oleObj spid="_x0000_s24583" name="PDF" r:id="rId3" imgW="0" imgH="360" progId="FoxitPhantomPDF.Document">
+                <p:oleObj spid="_x0000_s24587" name="PDF" r:id="rId3" imgW="0" imgH="360" progId="FoxitPhantomPDF.Document">
                   <p:embed/>
                 </p:oleObj>
               </mc:Choice>
@@ -6857,7 +6845,7 @@
           <a:graphicData uri="http://schemas.openxmlformats.org/presentationml/2006/ole">
             <mc:AlternateContent xmlns:mc="http://schemas.openxmlformats.org/markup-compatibility/2006">
               <mc:Choice xmlns:v="urn:schemas-microsoft-com:vml" Requires="v">
-                <p:oleObj spid="_x0000_s25607" name="PDF" r:id="rId3" imgW="0" imgH="360" progId="FoxitPhantomPDF.Document">
+                <p:oleObj spid="_x0000_s25611" name="PDF" r:id="rId3" imgW="0" imgH="360" progId="FoxitPhantomPDF.Document">
                   <p:embed/>
                 </p:oleObj>
               </mc:Choice>
@@ -7024,7 +7012,7 @@
           <a:graphicData uri="http://schemas.openxmlformats.org/presentationml/2006/ole">
             <mc:AlternateContent xmlns:mc="http://schemas.openxmlformats.org/markup-compatibility/2006">
               <mc:Choice xmlns:v="urn:schemas-microsoft-com:vml" Requires="v">
-                <p:oleObj spid="_x0000_s26630" name="PDF" r:id="rId3" imgW="0" imgH="360" progId="FoxitPhantomPDF.Document">
+                <p:oleObj spid="_x0000_s26634" name="PDF" r:id="rId3" imgW="0" imgH="360" progId="FoxitPhantomPDF.Document">
                   <p:embed/>
                 </p:oleObj>
               </mc:Choice>
@@ -7191,7 +7179,7 @@
           <a:graphicData uri="http://schemas.openxmlformats.org/presentationml/2006/ole">
             <mc:AlternateContent xmlns:mc="http://schemas.openxmlformats.org/markup-compatibility/2006">
               <mc:Choice xmlns:v="urn:schemas-microsoft-com:vml" Requires="v">
-                <p:oleObj spid="_x0000_s27654" name="PDF" r:id="rId3" imgW="0" imgH="360" progId="FoxitPhantomPDF.Document">
+                <p:oleObj spid="_x0000_s27658" name="PDF" r:id="rId3" imgW="0" imgH="360" progId="FoxitPhantomPDF.Document">
                   <p:embed/>
                 </p:oleObj>
               </mc:Choice>
@@ -33540,10 +33528,15 @@
             <p:ph type="title"/>
           </p:nvPr>
         </p:nvSpPr>
-        <p:spPr/>
+        <p:spPr>
+          <a:xfrm>
+            <a:off x="838200" y="365126"/>
+            <a:ext cx="10515600" cy="508332"/>
+          </a:xfrm>
+        </p:spPr>
         <p:txBody>
           <a:bodyPr>
-            <a:normAutofit/>
+            <a:normAutofit fontScale="90000"/>
           </a:bodyPr>
           <a:lstStyle/>
           <a:p>
@@ -33606,7 +33599,7 @@
       </p:sp>
       <p:graphicFrame>
         <p:nvGraphicFramePr>
-          <p:cNvPr id="5" name="Content Placeholder 4"/>
+          <p:cNvPr id="10" name="Content Placeholder 9"/>
           <p:cNvGraphicFramePr>
             <a:graphicFrameLocks noGrp="1" noChangeAspect="1"/>
           </p:cNvGraphicFramePr>
@@ -33614,20 +33607,20 @@
             <p:ph idx="1"/>
             <p:extLst>
               <p:ext uri="{D42A27DB-BD31-4B8C-83A1-F6EECF244321}">
-                <p14:modId xmlns:p14="http://schemas.microsoft.com/office/powerpoint/2010/main" val="465700827"/>
+                <p14:modId xmlns:p14="http://schemas.microsoft.com/office/powerpoint/2010/main" val="2615247122"/>
               </p:ext>
             </p:extLst>
           </p:nvPr>
         </p:nvGraphicFramePr>
         <p:xfrm>
-          <a:off x="736980" y="1241425"/>
-          <a:ext cx="10481480" cy="5480050"/>
+          <a:off x="423081" y="873458"/>
+          <a:ext cx="11573301" cy="5677467"/>
         </p:xfrm>
         <a:graphic>
           <a:graphicData uri="http://schemas.openxmlformats.org/presentationml/2006/ole">
             <mc:AlternateContent xmlns:mc="http://schemas.openxmlformats.org/markup-compatibility/2006">
               <mc:Choice xmlns:v="urn:schemas-microsoft-com:vml" Requires="v">
-                <p:oleObj spid="_x0000_s15367" name="PDF" r:id="rId3" imgW="0" imgH="360" progId="FoxitPhantomPDF.Document">
+                <p:oleObj spid="_x0000_s15371" name="PDF" r:id="rId3" imgW="0" imgH="360" progId="FoxitPhantomPDF.Document">
                   <p:embed/>
                 </p:oleObj>
               </mc:Choice>
@@ -33648,8 +33641,8 @@
                     </p:blipFill>
                     <p:spPr>
                       <a:xfrm>
-                        <a:off x="736980" y="1241425"/>
-                        <a:ext cx="10481480" cy="5480050"/>
+                        <a:off x="423081" y="873458"/>
+                        <a:ext cx="11573301" cy="5677467"/>
                       </a:xfrm>
                       <a:prstGeom prst="rect">
                         <a:avLst/>
@@ -33702,10 +33695,15 @@
             <p:ph type="title"/>
           </p:nvPr>
         </p:nvSpPr>
-        <p:spPr/>
+        <p:spPr>
+          <a:xfrm>
+            <a:off x="838200" y="365125"/>
+            <a:ext cx="10515600" cy="208081"/>
+          </a:xfrm>
+        </p:spPr>
         <p:txBody>
           <a:bodyPr>
-            <a:normAutofit/>
+            <a:normAutofit fontScale="90000"/>
           </a:bodyPr>
           <a:lstStyle/>
           <a:p>
@@ -33790,7 +33788,7 @@
       </p:sp>
       <p:graphicFrame>
         <p:nvGraphicFramePr>
-          <p:cNvPr id="6" name="Content Placeholder 5"/>
+          <p:cNvPr id="8" name="Content Placeholder 7"/>
           <p:cNvGraphicFramePr>
             <a:graphicFrameLocks noGrp="1" noChangeAspect="1"/>
           </p:cNvGraphicFramePr>
@@ -33798,20 +33796,20 @@
             <p:ph idx="1"/>
             <p:extLst>
               <p:ext uri="{D42A27DB-BD31-4B8C-83A1-F6EECF244321}">
-                <p14:modId xmlns:p14="http://schemas.microsoft.com/office/powerpoint/2010/main" val="2599282363"/>
+                <p14:modId xmlns:p14="http://schemas.microsoft.com/office/powerpoint/2010/main" val="883005892"/>
               </p:ext>
             </p:extLst>
           </p:nvPr>
         </p:nvGraphicFramePr>
         <p:xfrm>
-          <a:off x="1105470" y="1201004"/>
-          <a:ext cx="9976512" cy="5336274"/>
+          <a:off x="655093" y="723331"/>
+          <a:ext cx="11204811" cy="5868538"/>
         </p:xfrm>
         <a:graphic>
           <a:graphicData uri="http://schemas.openxmlformats.org/presentationml/2006/ole">
             <mc:AlternateContent xmlns:mc="http://schemas.openxmlformats.org/markup-compatibility/2006">
               <mc:Choice xmlns:v="urn:schemas-microsoft-com:vml" Requires="v">
-                <p:oleObj spid="_x0000_s16391" name="PDF" r:id="rId3" imgW="0" imgH="360" progId="FoxitPhantomPDF.Document">
+                <p:oleObj spid="_x0000_s16395" name="PDF" r:id="rId3" imgW="0" imgH="360" progId="FoxitPhantomPDF.Document">
                   <p:embed/>
                 </p:oleObj>
               </mc:Choice>
@@ -33832,8 +33830,8 @@
                     </p:blipFill>
                     <p:spPr>
                       <a:xfrm>
-                        <a:off x="1105470" y="1201004"/>
-                        <a:ext cx="9976512" cy="5336274"/>
+                        <a:off x="655093" y="723331"/>
+                        <a:ext cx="11204811" cy="5868538"/>
                       </a:xfrm>
                       <a:prstGeom prst="rect">
                         <a:avLst/>
@@ -33952,7 +33950,7 @@
       </p:sp>
       <p:graphicFrame>
         <p:nvGraphicFramePr>
-          <p:cNvPr id="5" name="Content Placeholder 4"/>
+          <p:cNvPr id="6" name="Content Placeholder 5"/>
           <p:cNvGraphicFramePr>
             <a:graphicFrameLocks noGrp="1" noChangeAspect="1"/>
           </p:cNvGraphicFramePr>
@@ -33960,20 +33958,20 @@
             <p:ph idx="1"/>
             <p:extLst>
               <p:ext uri="{D42A27DB-BD31-4B8C-83A1-F6EECF244321}">
-                <p14:modId xmlns:p14="http://schemas.microsoft.com/office/powerpoint/2010/main" val="1077406901"/>
+                <p14:modId xmlns:p14="http://schemas.microsoft.com/office/powerpoint/2010/main" val="1175189738"/>
               </p:ext>
             </p:extLst>
           </p:nvPr>
         </p:nvGraphicFramePr>
         <p:xfrm>
-          <a:off x="838201" y="1473200"/>
-          <a:ext cx="10748748" cy="5248275"/>
+          <a:off x="196186" y="1457135"/>
+          <a:ext cx="11799627" cy="5264339"/>
         </p:xfrm>
         <a:graphic>
           <a:graphicData uri="http://schemas.openxmlformats.org/presentationml/2006/ole">
             <mc:AlternateContent xmlns:mc="http://schemas.openxmlformats.org/markup-compatibility/2006">
               <mc:Choice xmlns:v="urn:schemas-microsoft-com:vml" Requires="v">
-                <p:oleObj spid="_x0000_s17415" name="PDF" r:id="rId3" imgW="0" imgH="360" progId="FoxitPhantomPDF.Document">
+                <p:oleObj spid="_x0000_s17419" name="PDF" r:id="rId3" imgW="0" imgH="360" progId="FoxitPhantomPDF.Document">
                   <p:embed/>
                 </p:oleObj>
               </mc:Choice>
@@ -33994,8 +33992,8 @@
                     </p:blipFill>
                     <p:spPr>
                       <a:xfrm>
-                        <a:off x="838201" y="1473200"/>
-                        <a:ext cx="10748748" cy="5248275"/>
+                        <a:off x="196186" y="1457135"/>
+                        <a:ext cx="11799627" cy="5264339"/>
                       </a:xfrm>
                       <a:prstGeom prst="rect">
                         <a:avLst/>
@@ -34110,14 +34108,6 @@
               </a:rPr>
               <a:t>)</a:t>
             </a:r>
-            <a:endParaRPr lang="en-US" sz="3000" dirty="0">
-              <a:solidFill>
-                <a:srgbClr val="0070C0"/>
-              </a:solidFill>
-              <a:latin typeface="Century Gothic" panose="020B0502020202020204" pitchFamily="34" charset="0"/>
-              <a:ea typeface="+mn-ea"/>
-              <a:cs typeface="+mn-cs"/>
-            </a:endParaRPr>
           </a:p>
         </p:txBody>
       </p:sp>
@@ -34145,64 +34135,33 @@
           </a:p>
         </p:txBody>
       </p:sp>
-      <p:graphicFrame>
-        <p:nvGraphicFramePr>
-          <p:cNvPr id="5" name="Content Placeholder 4"/>
-          <p:cNvGraphicFramePr>
-            <a:graphicFrameLocks noGrp="1" noChangeAspect="1"/>
-          </p:cNvGraphicFramePr>
+      <p:sp>
+        <p:nvSpPr>
+          <p:cNvPr id="3" name="Content Placeholder 2"/>
+          <p:cNvSpPr>
+            <a:spLocks noGrp="1"/>
+          </p:cNvSpPr>
           <p:nvPr>
             <p:ph idx="1"/>
-            <p:extLst>
-              <p:ext uri="{D42A27DB-BD31-4B8C-83A1-F6EECF244321}">
-                <p14:modId xmlns:p14="http://schemas.microsoft.com/office/powerpoint/2010/main" val="2557321044"/>
-              </p:ext>
-            </p:extLst>
           </p:nvPr>
-        </p:nvGraphicFramePr>
-        <p:xfrm>
-          <a:off x="584200" y="1282890"/>
-          <a:ext cx="11439478" cy="5206810"/>
-        </p:xfrm>
-        <a:graphic>
-          <a:graphicData uri="http://schemas.openxmlformats.org/presentationml/2006/ole">
-            <mc:AlternateContent xmlns:mc="http://schemas.openxmlformats.org/markup-compatibility/2006">
-              <mc:Choice xmlns:v="urn:schemas-microsoft-com:vml" Requires="v">
-                <p:oleObj spid="_x0000_s18438" name="PDF" r:id="rId3" imgW="0" imgH="360" progId="FoxitPhantomPDF.Document">
-                  <p:embed/>
-                </p:oleObj>
-              </mc:Choice>
-              <mc:Fallback>
-                <p:oleObj name="PDF" r:id="rId3" imgW="0" imgH="360" progId="FoxitPhantomPDF.Document">
-                  <p:embed/>
-                  <p:pic>
-                    <p:nvPicPr>
-                      <p:cNvPr id="0" name=""/>
-                      <p:cNvPicPr/>
-                      <p:nvPr/>
-                    </p:nvPicPr>
-                    <p:blipFill>
-                      <a:blip r:embed="rId4"/>
-                      <a:stretch>
-                        <a:fillRect/>
-                      </a:stretch>
-                    </p:blipFill>
-                    <p:spPr>
-                      <a:xfrm>
-                        <a:off x="584200" y="1282890"/>
-                        <a:ext cx="11439478" cy="5206810"/>
-                      </a:xfrm>
-                      <a:prstGeom prst="rect">
-                        <a:avLst/>
-                      </a:prstGeom>
-                    </p:spPr>
-                  </p:pic>
-                </p:oleObj>
-              </mc:Fallback>
-            </mc:AlternateContent>
-          </a:graphicData>
-        </a:graphic>
-      </p:graphicFrame>
+        </p:nvSpPr>
+        <p:spPr>
+          <a:xfrm>
+            <a:off x="491319" y="1214650"/>
+            <a:ext cx="10862481" cy="5141699"/>
+          </a:xfrm>
+        </p:spPr>
+        <p:txBody>
+          <a:bodyPr/>
+          <a:lstStyle/>
+          <a:p>
+            <a:pPr marL="0" indent="0">
+              <a:buNone/>
+            </a:pPr>
+            <a:endParaRPr lang="en-US" dirty="0"/>
+          </a:p>
+        </p:txBody>
+      </p:sp>
     </p:spTree>
     <p:extLst>
       <p:ext uri="{BB962C8B-B14F-4D97-AF65-F5344CB8AC3E}">
@@ -34355,7 +34314,7 @@
           <a:graphicData uri="http://schemas.openxmlformats.org/presentationml/2006/ole">
             <mc:AlternateContent xmlns:mc="http://schemas.openxmlformats.org/markup-compatibility/2006">
               <mc:Choice xmlns:v="urn:schemas-microsoft-com:vml" Requires="v">
-                <p:oleObj spid="_x0000_s19462" name="PDF" r:id="rId3" imgW="0" imgH="360" progId="FoxitPhantomPDF.Document">
+                <p:oleObj spid="_x0000_s19466" name="PDF" r:id="rId3" imgW="0" imgH="360" progId="FoxitPhantomPDF.Document">
                   <p:embed/>
                 </p:oleObj>
               </mc:Choice>
@@ -34564,7 +34523,7 @@
           <a:graphicData uri="http://schemas.openxmlformats.org/presentationml/2006/ole">
             <mc:AlternateContent xmlns:mc="http://schemas.openxmlformats.org/markup-compatibility/2006">
               <mc:Choice xmlns:v="urn:schemas-microsoft-com:vml" Requires="v">
-                <p:oleObj spid="_x0000_s20486" name="PDF" r:id="rId3" imgW="0" imgH="360" progId="FoxitPhantomPDF.Document">
+                <p:oleObj spid="_x0000_s20490" name="PDF" r:id="rId3" imgW="0" imgH="360" progId="FoxitPhantomPDF.Document">
                   <p:embed/>
                 </p:oleObj>
               </mc:Choice>
@@ -34751,7 +34710,7 @@
           <a:graphicData uri="http://schemas.openxmlformats.org/presentationml/2006/ole">
             <mc:AlternateContent xmlns:mc="http://schemas.openxmlformats.org/markup-compatibility/2006">
               <mc:Choice xmlns:v="urn:schemas-microsoft-com:vml" Requires="v">
-                <p:oleObj spid="_x0000_s21511" name="PDF" r:id="rId3" imgW="0" imgH="360" progId="FoxitPhantomPDF.Document">
+                <p:oleObj spid="_x0000_s21515" name="PDF" r:id="rId3" imgW="0" imgH="360" progId="FoxitPhantomPDF.Document">
                   <p:embed/>
                 </p:oleObj>
               </mc:Choice>

</xml_diff>